<commit_message>
Actualizacion MA_09_09_CO con revision de estilo
</commit_message>
<xml_diff>
--- a/fuentes/contenidos/grado09/guion09/MapaConceptual_MA_09_09_CO.pptx
+++ b/fuentes/contenidos/grado09/guion09/MapaConceptual_MA_09_09_CO.pptx
@@ -1923,16 +1923,16 @@
                 </a:solidFill>
                 <a:cs typeface="Arial" pitchFamily="34" charset="0"/>
               </a:rPr>
-              <a:t>Ángulos </a:t>
-            </a:r>
-            <a:r>
-              <a:rPr lang="es-CO" sz="1050" smtClean="0">
+              <a:t>án</a:t>
+            </a:r>
+            <a:r>
+              <a:rPr lang="es-CO" sz="1050" dirty="0" smtClean="0">
                 <a:solidFill>
                   <a:schemeClr val="bg1"/>
                 </a:solidFill>
                 <a:cs typeface="Arial" pitchFamily="34" charset="0"/>
               </a:rPr>
-              <a:t>correspondientes congruentes y </a:t>
+              <a:t>gulos </a:t>
             </a:r>
             <a:r>
               <a:rPr lang="es-CO" sz="1050" dirty="0" smtClean="0">
@@ -1941,7 +1941,7 @@
                 </a:solidFill>
                 <a:cs typeface="Arial" pitchFamily="34" charset="0"/>
               </a:rPr>
-              <a:t>lados correspondientes proporcionales </a:t>
+              <a:t>correspondientes congruentes y lados correspondientes proporcionales </a:t>
             </a:r>
             <a:endParaRPr lang="es-CO" sz="1050" dirty="0">
               <a:solidFill>
@@ -3308,7 +3308,15 @@
             </a:r>
             <a:r>
               <a:rPr lang="es-ES_tradnl" sz="900" i="1" dirty="0" smtClean="0"/>
-              <a:t>¬p→ ¬q</a:t>
+              <a:t>¬</a:t>
+            </a:r>
+            <a:r>
+              <a:rPr lang="es-ES_tradnl" sz="900" i="1" dirty="0"/>
+              <a:t>q</a:t>
+            </a:r>
+            <a:r>
+              <a:rPr lang="es-ES_tradnl" sz="900" i="1" dirty="0" smtClean="0"/>
+              <a:t> → ¬p</a:t>
             </a:r>
             <a:r>
               <a:rPr lang="es-ES_tradnl" sz="900" dirty="0" smtClean="0"/>
@@ -4529,7 +4537,7 @@
                 </a:solidFill>
                 <a:cs typeface="Arial" pitchFamily="34" charset="0"/>
               </a:rPr>
-              <a:t> estoces  q es verdad </a:t>
+              <a:t> entonces  q es verdad </a:t>
             </a:r>
           </a:p>
           <a:p>

</xml_diff>